<commit_message>
Just change speaker name
</commit_message>
<xml_diff>
--- a/Slides/0 - Intro.pptx
+++ b/Slides/0 - Intro.pptx
@@ -135,7 +135,7 @@
       </p14:sectionLst>
     </p:ext>
     <p:ext uri="{EFAFB233-063F-42B5-8137-9DF3F51BA10A}">
-      <p15:sldGuideLst xmlns:p15="http://schemas.microsoft.com/office/powerpoint/2012/main">
+      <p15:sldGuideLst xmlns:p15="http://schemas.microsoft.com/office/powerpoint/2012/main" xmlns="">
         <p15:guide id="1" orient="horz" pos="2203">
           <p15:clr>
             <a:srgbClr val="A4A3A4"/>
@@ -149,7 +149,7 @@
       </p15:sldGuideLst>
     </p:ext>
     <p:ext uri="{2D200454-40CA-4A62-9FC3-DE9A4176ACB9}">
-      <p15:notesGuideLst xmlns:p15="http://schemas.microsoft.com/office/powerpoint/2012/main">
+      <p15:notesGuideLst xmlns:p15="http://schemas.microsoft.com/office/powerpoint/2012/main" xmlns="">
         <p15:guide id="1" orient="horz" pos="2880">
           <p15:clr>
             <a:srgbClr val="A4A3A4"/>
@@ -261,7 +261,7 @@
               <a:rPr lang="en-US" smtClean="0">
                 <a:latin typeface="Segoe UI" pitchFamily="34" charset="0"/>
               </a:rPr>
-              <a:t>6/10/2019 8:04 AM</a:t>
+              <a:t>9/25/2019 3:00 PM</a:t>
             </a:fld>
             <a:endParaRPr lang="en-US" dirty="0">
               <a:latin typeface="Segoe UI" pitchFamily="34" charset="0"/>
@@ -539,7 +539,7 @@
           <a:p>
             <a:fld id="{38EEC551-8CDA-4EB6-89BB-2A86C9F091C8}" type="datetime8">
               <a:rPr lang="en-US" smtClean="0"/>
-              <a:t>6/10/2019 8:04 AM</a:t>
+              <a:t>9/25/2019 3:00 PM</a:t>
             </a:fld>
             <a:endParaRPr lang="en-US" dirty="0"/>
           </a:p>
@@ -38702,7 +38702,7 @@
   </p:txStyles>
   <p:extLst>
     <p:ext uri="{27BBF7A9-308A-43DC-89C8-2F10F3537804}">
-      <p15:sldGuideLst xmlns:p15="http://schemas.microsoft.com/office/powerpoint/2012/main">
+      <p15:sldGuideLst xmlns:p15="http://schemas.microsoft.com/office/powerpoint/2012/main" xmlns="">
         <p15:guide id="1" orient="horz" pos="187">
           <p15:clr>
             <a:srgbClr val="5ACBF0"/>
@@ -38987,7 +38987,7 @@
           <p:cNvPr id="4" name="Title 3">
             <a:extLst>
               <a:ext uri="{FF2B5EF4-FFF2-40B4-BE49-F238E27FC236}">
-                <a16:creationId xmlns:a16="http://schemas.microsoft.com/office/drawing/2014/main" id="{D95EC9E8-E557-4DD4-B0B1-298D6D2E9E8E}"/>
+                <a16:creationId xmlns:a16="http://schemas.microsoft.com/office/drawing/2014/main" xmlns="" id="{D95EC9E8-E557-4DD4-B0B1-298D6D2E9E8E}"/>
               </a:ext>
             </a:extLst>
           </p:cNvPr>
@@ -39015,7 +39015,7 @@
           <p:cNvPr id="5" name="Text Placeholder 4">
             <a:extLst>
               <a:ext uri="{FF2B5EF4-FFF2-40B4-BE49-F238E27FC236}">
-                <a16:creationId xmlns:a16="http://schemas.microsoft.com/office/drawing/2014/main" id="{A176E7C6-40A9-4B8A-BA06-DD25C651D6EF}"/>
+                <a16:creationId xmlns:a16="http://schemas.microsoft.com/office/drawing/2014/main" xmlns="" id="{A176E7C6-40A9-4B8A-BA06-DD25C651D6EF}"/>
               </a:ext>
             </a:extLst>
           </p:cNvPr>
@@ -39090,7 +39090,7 @@
           <p:cNvPr id="2" name="Title 1">
             <a:extLst>
               <a:ext uri="{FF2B5EF4-FFF2-40B4-BE49-F238E27FC236}">
-                <a16:creationId xmlns:a16="http://schemas.microsoft.com/office/drawing/2014/main" id="{981FE2E8-1A2B-49CE-83AD-E15DF58CF4C9}"/>
+                <a16:creationId xmlns:a16="http://schemas.microsoft.com/office/drawing/2014/main" xmlns="" id="{981FE2E8-1A2B-49CE-83AD-E15DF58CF4C9}"/>
               </a:ext>
             </a:extLst>
           </p:cNvPr>
@@ -39118,7 +39118,7 @@
           <p:cNvPr id="3" name="Text Placeholder 2">
             <a:extLst>
               <a:ext uri="{FF2B5EF4-FFF2-40B4-BE49-F238E27FC236}">
-                <a16:creationId xmlns:a16="http://schemas.microsoft.com/office/drawing/2014/main" id="{0471CC63-3591-477A-BC8A-B147C4747F1B}"/>
+                <a16:creationId xmlns:a16="http://schemas.microsoft.com/office/drawing/2014/main" xmlns="" id="{0471CC63-3591-477A-BC8A-B147C4747F1B}"/>
               </a:ext>
             </a:extLst>
           </p:cNvPr>
@@ -39222,7 +39222,7 @@
           <p:cNvPr id="2" name="Title 1">
             <a:extLst>
               <a:ext uri="{FF2B5EF4-FFF2-40B4-BE49-F238E27FC236}">
-                <a16:creationId xmlns:a16="http://schemas.microsoft.com/office/drawing/2014/main" id="{7F4DC965-67A0-4ECD-BE79-679675EFEA68}"/>
+                <a16:creationId xmlns:a16="http://schemas.microsoft.com/office/drawing/2014/main" xmlns="" id="{7F4DC965-67A0-4ECD-BE79-679675EFEA68}"/>
               </a:ext>
             </a:extLst>
           </p:cNvPr>
@@ -39239,9 +39239,18 @@
           <a:lstStyle/>
           <a:p>
             <a:r>
-              <a:rPr lang="en-US" dirty="0"/>
-              <a:t>Christopher Harrison</a:t>
+              <a:rPr lang="en-US" dirty="0" err="1" smtClean="0"/>
+              <a:t>Nguyễn</a:t>
             </a:r>
+            <a:r>
+              <a:rPr lang="en-US" dirty="0" smtClean="0"/>
+              <a:t> Thu </a:t>
+            </a:r>
+            <a:r>
+              <a:rPr lang="en-US" dirty="0" err="1" smtClean="0"/>
+              <a:t>Phương</a:t>
+            </a:r>
+            <a:endParaRPr lang="en-US" dirty="0"/>
           </a:p>
         </p:txBody>
       </p:sp>
@@ -39250,7 +39259,7 @@
           <p:cNvPr id="3" name="Text Placeholder 2">
             <a:extLst>
               <a:ext uri="{FF2B5EF4-FFF2-40B4-BE49-F238E27FC236}">
-                <a16:creationId xmlns:a16="http://schemas.microsoft.com/office/drawing/2014/main" id="{84EE68AA-6EB5-438E-A15C-828AAFD3F354}"/>
+                <a16:creationId xmlns:a16="http://schemas.microsoft.com/office/drawing/2014/main" xmlns="" id="{84EE68AA-6EB5-438E-A15C-828AAFD3F354}"/>
               </a:ext>
             </a:extLst>
           </p:cNvPr>
@@ -39264,7 +39273,7 @@
         <p:spPr>
           <a:xfrm>
             <a:off x="365760" y="1371600"/>
-            <a:ext cx="11704320" cy="3360920"/>
+            <a:ext cx="11704320" cy="2431435"/>
           </a:xfrm>
         </p:spPr>
         <p:txBody>
@@ -39272,32 +39281,21 @@
           <a:lstStyle/>
           <a:p>
             <a:r>
-              <a:rPr lang="en-US" dirty="0"/>
-              <a:t>Product Manager, Academic Ecosystems</a:t>
-            </a:r>
-            <a:r>
-              <a:rPr lang="en-US"/>
-              <a:t>, Microsoft</a:t>
+              <a:rPr lang="en-US" dirty="0" smtClean="0"/>
+              <a:t>Web Developer, Product Manager, Microsoft</a:t>
             </a:r>
             <a:endParaRPr lang="en-US" dirty="0"/>
           </a:p>
           <a:p>
             <a:r>
-              <a:rPr lang="en-US" dirty="0"/>
-              <a:t>Web developer at heart</a:t>
+              <a:rPr lang="en-US" dirty="0" smtClean="0"/>
+              <a:t>First </a:t>
             </a:r>
-          </a:p>
-          <a:p>
             <a:r>
-              <a:rPr lang="en-US" dirty="0"/>
-              <a:t>Marathoner &amp; Yogi</a:t>
+              <a:rPr lang="en-US" smtClean="0"/>
+              <a:t>time developer</a:t>
             </a:r>
-          </a:p>
-          <a:p>
-            <a:r>
-              <a:rPr lang="en-US" dirty="0"/>
-              <a:t>Husband &amp; Father of one four-legged child</a:t>
-            </a:r>
+            <a:endParaRPr lang="en-US" dirty="0"/>
           </a:p>
           <a:p>
             <a:endParaRPr lang="en-US" dirty="0"/>
@@ -39356,7 +39354,7 @@
           <p:cNvPr id="2" name="Title 1">
             <a:extLst>
               <a:ext uri="{FF2B5EF4-FFF2-40B4-BE49-F238E27FC236}">
-                <a16:creationId xmlns:a16="http://schemas.microsoft.com/office/drawing/2014/main" id="{1F5F9897-8471-4310-8D6F-7125E329E251}"/>
+                <a16:creationId xmlns:a16="http://schemas.microsoft.com/office/drawing/2014/main" xmlns="" id="{1F5F9897-8471-4310-8D6F-7125E329E251}"/>
               </a:ext>
             </a:extLst>
           </p:cNvPr>
@@ -39384,7 +39382,7 @@
           <p:cNvPr id="3" name="Text Placeholder 2">
             <a:extLst>
               <a:ext uri="{FF2B5EF4-FFF2-40B4-BE49-F238E27FC236}">
-                <a16:creationId xmlns:a16="http://schemas.microsoft.com/office/drawing/2014/main" id="{C37AAC50-665B-48DC-BAF9-38ED5A9B1318}"/>
+                <a16:creationId xmlns:a16="http://schemas.microsoft.com/office/drawing/2014/main" xmlns="" id="{C37AAC50-665B-48DC-BAF9-38ED5A9B1318}"/>
               </a:ext>
             </a:extLst>
           </p:cNvPr>
@@ -39496,7 +39494,7 @@
           <p:cNvPr id="2" name="Title 1">
             <a:extLst>
               <a:ext uri="{FF2B5EF4-FFF2-40B4-BE49-F238E27FC236}">
-                <a16:creationId xmlns:a16="http://schemas.microsoft.com/office/drawing/2014/main" id="{93BCE4BB-A3AA-4D8D-B787-2CCB7EFB94A9}"/>
+                <a16:creationId xmlns:a16="http://schemas.microsoft.com/office/drawing/2014/main" xmlns="" id="{93BCE4BB-A3AA-4D8D-B787-2CCB7EFB94A9}"/>
               </a:ext>
             </a:extLst>
           </p:cNvPr>
@@ -39524,7 +39522,7 @@
           <p:cNvPr id="3" name="Text Placeholder 2">
             <a:extLst>
               <a:ext uri="{FF2B5EF4-FFF2-40B4-BE49-F238E27FC236}">
-                <a16:creationId xmlns:a16="http://schemas.microsoft.com/office/drawing/2014/main" id="{82C2D651-6274-4700-9A42-90289CFD694A}"/>
+                <a16:creationId xmlns:a16="http://schemas.microsoft.com/office/drawing/2014/main" xmlns="" id="{82C2D651-6274-4700-9A42-90289CFD694A}"/>
               </a:ext>
             </a:extLst>
           </p:cNvPr>
@@ -39607,7 +39605,7 @@
           <p:cNvPr id="2" name="Title 1">
             <a:extLst>
               <a:ext uri="{FF2B5EF4-FFF2-40B4-BE49-F238E27FC236}">
-                <a16:creationId xmlns:a16="http://schemas.microsoft.com/office/drawing/2014/main" id="{3C4E7F16-EF3F-4A2D-A796-3B5CD989004B}"/>
+                <a16:creationId xmlns:a16="http://schemas.microsoft.com/office/drawing/2014/main" xmlns="" id="{3C4E7F16-EF3F-4A2D-A796-3B5CD989004B}"/>
               </a:ext>
             </a:extLst>
           </p:cNvPr>
@@ -39635,7 +39633,7 @@
           <p:cNvPr id="3" name="Text Placeholder 2">
             <a:extLst>
               <a:ext uri="{FF2B5EF4-FFF2-40B4-BE49-F238E27FC236}">
-                <a16:creationId xmlns:a16="http://schemas.microsoft.com/office/drawing/2014/main" id="{2C4A0986-EE74-4825-81A3-31F6EB169C52}"/>
+                <a16:creationId xmlns:a16="http://schemas.microsoft.com/office/drawing/2014/main" xmlns="" id="{2C4A0986-EE74-4825-81A3-31F6EB169C52}"/>
               </a:ext>
             </a:extLst>
           </p:cNvPr>
@@ -40258,7 +40256,7 @@
   <a:extraClrSchemeLst/>
   <a:extLst>
     <a:ext uri="{05A4C25C-085E-4340-85A3-A5531E510DB2}">
-      <thm15:themeFamily xmlns:thm15="http://schemas.microsoft.com/office/thememl/2012/main" name="Brand_template_16-9_Consumer_GREEN_1.potx" id="{E6351070-060E-4EB7-8FC9-7F6CD9537A4B}" vid="{9FBE0A09-7139-47DB-B6B8-8BE9F30C10C8}"/>
+      <thm15:themeFamily xmlns:thm15="http://schemas.microsoft.com/office/thememl/2012/main" xmlns="" name="Brand_template_16-9_Consumer_GREEN_1.potx" id="{E6351070-060E-4EB7-8FC9-7F6CD9537A4B}" vid="{9FBE0A09-7139-47DB-B6B8-8BE9F30C10C8}"/>
     </a:ext>
   </a:extLst>
 </a:theme>
@@ -40831,122 +40829,104 @@
 </file>
 
 <file path=customXml/item1.xml><?xml version="1.0" encoding="utf-8"?>
-<p:properties xmlns:p="http://schemas.microsoft.com/office/2006/metadata/properties" xmlns:xsi="http://www.w3.org/2001/XMLSchema-instance" xmlns:pc="http://schemas.microsoft.com/office/infopath/2007/PartnerControls">
-  <documentManagement>
-    <SharedWithUsers xmlns="83cd2334-221a-48c3-9034-bfd1542dfe28">
-      <UserInfo>
-        <DisplayName>Gilad Turbahn</DisplayName>
-        <AccountId>511</AccountId>
-        <AccountType/>
-      </UserInfo>
-      <UserInfo>
-        <DisplayName>Keith Boyd</DisplayName>
-        <AccountId>993</AccountId>
-        <AccountType/>
-      </UserInfo>
-      <UserInfo>
-        <DisplayName>Christopher Harrison</DisplayName>
-        <AccountId>1176</AccountId>
-        <AccountType/>
-      </UserInfo>
-    </SharedWithUsers>
-  </documentManagement>
-</p:properties>
+<Control xmlns="http://schemas.microsoft.com/VisualStudio/2011/storyboarding/control">
+  <Id Name="369f9055-6b6c-48b9-9320-5df2d46c430a" Revision="1" Stencil="7276b9ef-3953-4dce-a89b-ed85f20b8b93" StencilVersion="1.0"/>
+</Control>
 </file>
 
 <file path=customXml/item10.xml><?xml version="1.0" encoding="utf-8"?>
+<Control xmlns="http://schemas.microsoft.com/VisualStudio/2011/storyboarding/control">
+  <Id Name="a2191c86-fc50-4add-948c-129f6b5a88d8" Revision="1" Stencil="7276b9ef-3953-4dce-a89b-ed85f20b8b93" StencilVersion="1.0"/>
+</Control>
+</file>
+
+<file path=customXml/item11.xml><?xml version="1.0" encoding="utf-8"?>
 <Control xmlns="http://schemas.microsoft.com/VisualStudio/2011/storyboarding/control">
   <Id Name="d69996e1-3d61-4686-9b63-f1b855c596ab" Revision="1" Stencil="7276b9ef-3953-4dce-a89b-ed85f20b8b93" StencilVersion="1.0"/>
 </Control>
 </file>
 
-<file path=customXml/item11.xml><?xml version="1.0" encoding="utf-8"?>
+<file path=customXml/item12.xml><?xml version="1.0" encoding="utf-8"?>
+<Control xmlns="http://schemas.microsoft.com/VisualStudio/2011/storyboarding/control">
+  <Id Name="fb22c541-ded0-47fa-8877-83a4c2d16227" Revision="1" Stencil="7276b9ef-3953-4dce-a89b-ed85f20b8b93" StencilVersion="1.0"/>
+</Control>
+</file>
+
+<file path=customXml/item13.xml><?xml version="1.0" encoding="utf-8"?>
+<Control xmlns="http://schemas.microsoft.com/VisualStudio/2011/storyboarding/control">
+  <Id Name="d69996e1-3d61-4686-9b63-f1b855c596ab" Revision="1" Stencil="7276b9ef-3953-4dce-a89b-ed85f20b8b93" StencilVersion="1.0"/>
+</Control>
+</file>
+
+<file path=customXml/item14.xml><?xml version="1.0" encoding="utf-8"?>
+<Control xmlns="http://schemas.microsoft.com/VisualStudio/2011/storyboarding/control">
+  <Id Name="d69996e1-3d61-4686-9b63-f1b855c596ab" Revision="1" Stencil="7276b9ef-3953-4dce-a89b-ed85f20b8b93" StencilVersion="1.0"/>
+</Control>
+</file>
+
+<file path=customXml/item15.xml><?xml version="1.0" encoding="utf-8"?>
+<Control xmlns="http://schemas.microsoft.com/VisualStudio/2011/storyboarding/control">
+  <Id Name="fb22c541-ded0-47fa-8877-83a4c2d16227" Revision="1" Stencil="7276b9ef-3953-4dce-a89b-ed85f20b8b93" StencilVersion="1.0"/>
+</Control>
+</file>
+
+<file path=customXml/item16.xml><?xml version="1.0" encoding="utf-8"?>
 <Control xmlns="http://schemas.microsoft.com/VisualStudio/2011/storyboarding/control">
   <Id Name="a2191c86-fc50-4add-948c-129f6b5a88d8" Revision="1" Stencil="7276b9ef-3953-4dce-a89b-ed85f20b8b93" StencilVersion="1.0"/>
 </Control>
 </file>
 
-<file path=customXml/item12.xml><?xml version="1.0" encoding="utf-8"?>
+<file path=customXml/item17.xml><?xml version="1.0" encoding="utf-8"?>
 <Control xmlns="http://schemas.microsoft.com/VisualStudio/2011/storyboarding/control">
   <Id Name="d69996e1-3d61-4686-9b63-f1b855c596ab" Revision="1" Stencil="7276b9ef-3953-4dce-a89b-ed85f20b8b93" StencilVersion="1.0"/>
 </Control>
 </file>
 
-<file path=customXml/item13.xml><?xml version="1.0" encoding="utf-8"?>
+<file path=customXml/item18.xml><?xml version="1.0" encoding="utf-8"?>
+<Control xmlns="http://schemas.microsoft.com/VisualStudio/2011/storyboarding/control">
+  <Id Name="fb22c541-ded0-47fa-8877-83a4c2d16227" Revision="1" Stencil="7276b9ef-3953-4dce-a89b-ed85f20b8b93" StencilVersion="1.0"/>
+</Control>
+</file>
+
+<file path=customXml/item19.xml><?xml version="1.0" encoding="utf-8"?>
+<Control xmlns="http://schemas.microsoft.com/VisualStudio/2011/storyboarding/control">
+  <Id Name="a53d73d2-368b-429e-b817-1324eec1382c" Revision="1" Stencil="7276b9ef-3953-4dce-a89b-ed85f20b8b93" StencilVersion="1.0"/>
+</Control>
+</file>
+
+<file path=customXml/item2.xml><?xml version="1.0" encoding="utf-8"?>
+<Control xmlns="http://schemas.microsoft.com/VisualStudio/2011/storyboarding/control">
+  <Id Name="a53d73d2-368b-429e-b817-1324eec1382c" Revision="1" Stencil="7276b9ef-3953-4dce-a89b-ed85f20b8b93" StencilVersion="1.0"/>
+</Control>
+</file>
+
+<file path=customXml/item20.xml><?xml version="1.0" encoding="utf-8"?>
 <Control xmlns="http://schemas.microsoft.com/VisualStudio/2011/storyboarding/control">
   <Id Name="369f9055-6b6c-48b9-9320-5df2d46c430a" Revision="1" Stencil="7276b9ef-3953-4dce-a89b-ed85f20b8b93" StencilVersion="1.0"/>
 </Control>
 </file>
 
-<file path=customXml/item14.xml><?xml version="1.0" encoding="utf-8"?>
+<file path=customXml/item21.xml><?xml version="1.0" encoding="utf-8"?>
 <Control xmlns="http://schemas.microsoft.com/VisualStudio/2011/storyboarding/control">
   <Id Name="a2191c86-fc50-4add-948c-129f6b5a88d8" Revision="1" Stencil="7276b9ef-3953-4dce-a89b-ed85f20b8b93" StencilVersion="1.0"/>
 </Control>
 </file>
 
-<file path=customXml/item15.xml><?xml version="1.0" encoding="utf-8"?>
+<file path=customXml/item22.xml><?xml version="1.0" encoding="utf-8"?>
 <Control xmlns="http://schemas.microsoft.com/VisualStudio/2011/storyboarding/control">
-  <Id Name="d69996e1-3d61-4686-9b63-f1b855c596ab" Revision="1" Stencil="7276b9ef-3953-4dce-a89b-ed85f20b8b93" StencilVersion="1.0"/>
+  <Id Name="a2191c86-fc50-4add-948c-129f6b5a88d8" Revision="1" Stencil="7276b9ef-3953-4dce-a89b-ed85f20b8b93" StencilVersion="1.0"/>
 </Control>
 </file>
 
-<file path=customXml/item16.xml><?xml version="1.0" encoding="utf-8"?>
+<file path=customXml/item23.xml><?xml version="1.0" encoding="utf-8"?>
 <Control xmlns="http://schemas.microsoft.com/VisualStudio/2011/storyboarding/control">
   <Id Name="a53d73d2-368b-429e-b817-1324eec1382c" Revision="1" Stencil="7276b9ef-3953-4dce-a89b-ed85f20b8b93" StencilVersion="1.0"/>
 </Control>
 </file>
 
-<file path=customXml/item17.xml><?xml version="1.0" encoding="utf-8"?>
-<Control xmlns="http://schemas.microsoft.com/VisualStudio/2011/storyboarding/control">
-  <Id Name="369f9055-6b6c-48b9-9320-5df2d46c430a" Revision="1" Stencil="7276b9ef-3953-4dce-a89b-ed85f20b8b93" StencilVersion="1.0"/>
-</Control>
-</file>
-
-<file path=customXml/item18.xml><?xml version="1.0" encoding="utf-8"?>
+<file path=customXml/item24.xml><?xml version="1.0" encoding="utf-8"?>
 <Control xmlns="http://schemas.microsoft.com/VisualStudio/2011/storyboarding/control">
   <Id Name="a53d73d2-368b-429e-b817-1324eec1382c" Revision="1" Stencil="7276b9ef-3953-4dce-a89b-ed85f20b8b93" StencilVersion="1.0"/>
-</Control>
-</file>
-
-<file path=customXml/item19.xml><?xml version="1.0" encoding="utf-8"?>
-<Control xmlns="http://schemas.microsoft.com/VisualStudio/2011/storyboarding/control">
-  <Id Name="fb22c541-ded0-47fa-8877-83a4c2d16227" Revision="1" Stencil="7276b9ef-3953-4dce-a89b-ed85f20b8b93" StencilVersion="1.0"/>
-</Control>
-</file>
-
-<file path=customXml/item2.xml><?xml version="1.0" encoding="utf-8"?>
-<Control xmlns="http://schemas.microsoft.com/VisualStudio/2011/storyboarding/control">
-  <Id Name="369f9055-6b6c-48b9-9320-5df2d46c430a" Revision="1" Stencil="7276b9ef-3953-4dce-a89b-ed85f20b8b93" StencilVersion="1.0"/>
-</Control>
-</file>
-
-<file path=customXml/item20.xml><?xml version="1.0" encoding="utf-8"?>
-<Control xmlns="http://schemas.microsoft.com/VisualStudio/2011/storyboarding/control">
-  <Id Name="fb22c541-ded0-47fa-8877-83a4c2d16227" Revision="1" Stencil="7276b9ef-3953-4dce-a89b-ed85f20b8b93" StencilVersion="1.0"/>
-</Control>
-</file>
-
-<file path=customXml/item21.xml><?xml version="1.0" encoding="utf-8"?>
-<Control xmlns="http://schemas.microsoft.com/VisualStudio/2011/storyboarding/control">
-  <Id Name="d69996e1-3d61-4686-9b63-f1b855c596ab" Revision="1" Stencil="7276b9ef-3953-4dce-a89b-ed85f20b8b93" StencilVersion="1.0"/>
-</Control>
-</file>
-
-<file path=customXml/item22.xml><?xml version="1.0" encoding="utf-8"?>
-<Control xmlns="http://schemas.microsoft.com/VisualStudio/2011/storyboarding/control">
-  <Id Name="a53d73d2-368b-429e-b817-1324eec1382c" Revision="1" Stencil="7276b9ef-3953-4dce-a89b-ed85f20b8b93" StencilVersion="1.0"/>
-</Control>
-</file>
-
-<file path=customXml/item23.xml><?xml version="1.0" encoding="utf-8"?>
-<Control xmlns="http://schemas.microsoft.com/VisualStudio/2011/storyboarding/control">
-  <Id Name="fb22c541-ded0-47fa-8877-83a4c2d16227" Revision="1" Stencil="7276b9ef-3953-4dce-a89b-ed85f20b8b93" StencilVersion="1.0"/>
-</Control>
-</file>
-
-<file path=customXml/item24.xml><?xml version="1.0" encoding="utf-8"?>
-<Control xmlns="http://schemas.microsoft.com/VisualStudio/2011/storyboarding/control">
-  <Id Name="d69996e1-3d61-4686-9b63-f1b855c596ab" Revision="1" Stencil="7276b9ef-3953-4dce-a89b-ed85f20b8b93" StencilVersion="1.0"/>
 </Control>
 </file>
 
@@ -40958,119 +40938,11 @@
 
 <file path=customXml/item26.xml><?xml version="1.0" encoding="utf-8"?>
 <Control xmlns="http://schemas.microsoft.com/VisualStudio/2011/storyboarding/control">
-  <Id Name="a53d73d2-368b-429e-b817-1324eec1382c" Revision="1" Stencil="7276b9ef-3953-4dce-a89b-ed85f20b8b93" StencilVersion="1.0"/>
+  <Id Name="fb22c541-ded0-47fa-8877-83a4c2d16227" Revision="1" Stencil="7276b9ef-3953-4dce-a89b-ed85f20b8b93" StencilVersion="1.0"/>
 </Control>
 </file>
 
 <file path=customXml/item27.xml><?xml version="1.0" encoding="utf-8"?>
-<Control xmlns="http://schemas.microsoft.com/VisualStudio/2011/storyboarding/control">
-  <Id Name="a53d73d2-368b-429e-b817-1324eec1382c" Revision="1" Stencil="7276b9ef-3953-4dce-a89b-ed85f20b8b93" StencilVersion="1.0"/>
-</Control>
-</file>
-
-<file path=customXml/item28.xml><?xml version="1.0" encoding="utf-8"?>
-<Control xmlns="http://schemas.microsoft.com/VisualStudio/2011/storyboarding/control">
-  <Id Name="a2191c86-fc50-4add-948c-129f6b5a88d8" Revision="1" Stencil="7276b9ef-3953-4dce-a89b-ed85f20b8b93" StencilVersion="1.0"/>
-</Control>
-</file>
-
-<file path=customXml/item29.xml><?xml version="1.0" encoding="utf-8"?>
-<Control xmlns="http://schemas.microsoft.com/VisualStudio/2011/storyboarding/control">
-  <Id Name="369f9055-6b6c-48b9-9320-5df2d46c430a" Revision="1" Stencil="7276b9ef-3953-4dce-a89b-ed85f20b8b93" StencilVersion="1.0"/>
-</Control>
-</file>
-
-<file path=customXml/item3.xml><?xml version="1.0" encoding="utf-8"?>
-<Control xmlns="http://schemas.microsoft.com/VisualStudio/2011/storyboarding/control">
-  <Id Name="369f9055-6b6c-48b9-9320-5df2d46c430a" Revision="1" Stencil="7276b9ef-3953-4dce-a89b-ed85f20b8b93" StencilVersion="1.0"/>
-</Control>
-</file>
-
-<file path=customXml/item30.xml><?xml version="1.0" encoding="utf-8"?>
-<Control xmlns="http://schemas.microsoft.com/VisualStudio/2011/storyboarding/control">
-  <Id Name="a2191c86-fc50-4add-948c-129f6b5a88d8" Revision="1" Stencil="7276b9ef-3953-4dce-a89b-ed85f20b8b93" StencilVersion="1.0"/>
-</Control>
-</file>
-
-<file path=customXml/item31.xml><?xml version="1.0" encoding="utf-8"?>
-<Control xmlns="http://schemas.microsoft.com/VisualStudio/2011/storyboarding/control">
-  <Id Name="a53d73d2-368b-429e-b817-1324eec1382c" Revision="1" Stencil="7276b9ef-3953-4dce-a89b-ed85f20b8b93" StencilVersion="1.0"/>
-</Control>
-</file>
-
-<file path=customXml/item32.xml><?xml version="1.0" encoding="utf-8"?>
-<Control xmlns="http://schemas.microsoft.com/VisualStudio/2011/storyboarding/control">
-  <Id Name="fb22c541-ded0-47fa-8877-83a4c2d16227" Revision="1" Stencil="7276b9ef-3953-4dce-a89b-ed85f20b8b93" StencilVersion="1.0"/>
-</Control>
-</file>
-
-<file path=customXml/item33.xml><?xml version="1.0" encoding="utf-8"?>
-<?mso-contentType ?>
-<FormTemplates xmlns="http://schemas.microsoft.com/sharepoint/v3/contenttype/forms">
-  <Display>DocumentLibraryForm</Display>
-  <Edit>DocumentLibraryForm</Edit>
-  <New>DocumentLibraryForm</New>
-</FormTemplates>
-</file>
-
-<file path=customXml/item34.xml><?xml version="1.0" encoding="utf-8"?>
-<Control xmlns="http://schemas.microsoft.com/VisualStudio/2011/storyboarding/control">
-  <Id Name="fb22c541-ded0-47fa-8877-83a4c2d16227" Revision="1" Stencil="7276b9ef-3953-4dce-a89b-ed85f20b8b93" StencilVersion="1.0"/>
-</Control>
-</file>
-
-<file path=customXml/item35.xml><?xml version="1.0" encoding="utf-8"?>
-<Control xmlns="http://schemas.microsoft.com/VisualStudio/2011/storyboarding/control">
-  <Id Name="fb22c541-ded0-47fa-8877-83a4c2d16227" Revision="1" Stencil="7276b9ef-3953-4dce-a89b-ed85f20b8b93" StencilVersion="1.0"/>
-</Control>
-</file>
-
-<file path=customXml/item4.xml><?xml version="1.0" encoding="utf-8"?>
-<Control xmlns="http://schemas.microsoft.com/VisualStudio/2011/storyboarding/control">
-  <Id Name="369f9055-6b6c-48b9-9320-5df2d46c430a" Revision="1" Stencil="7276b9ef-3953-4dce-a89b-ed85f20b8b93" StencilVersion="1.0"/>
-</Control>
-</file>
-
-<file path=customXml/item5.xml><?xml version="1.0" encoding="utf-8"?>
-<Control xmlns="http://schemas.microsoft.com/VisualStudio/2011/storyboarding/control">
-  <Id Name="d69996e1-3d61-4686-9b63-f1b855c596ab" Revision="1" Stencil="7276b9ef-3953-4dce-a89b-ed85f20b8b93" StencilVersion="1.0"/>
-</Control>
-</file>
-
-<file path=customXml/item6.xml><?xml version="1.0" encoding="utf-8"?>
-<p:properties xmlns:p="http://schemas.microsoft.com/office/2006/metadata/properties" xmlns:xsi="http://www.w3.org/2001/XMLSchema-instance" xmlns:pc="http://schemas.microsoft.com/office/infopath/2007/PartnerControls">
-  <documentManagement>
-    <SharedWithUsers xmlns="83cd2334-221a-48c3-9034-bfd1542dfe28">
-      <UserInfo>
-        <DisplayName>Gilad Turbahn</DisplayName>
-        <AccountId>511</AccountId>
-        <AccountType/>
-      </UserInfo>
-      <UserInfo>
-        <DisplayName>Keith Boyd</DisplayName>
-        <AccountId>993</AccountId>
-        <AccountType/>
-      </UserInfo>
-      <UserInfo>
-        <DisplayName>Christopher Harrison</DisplayName>
-        <AccountId>1176</AccountId>
-        <AccountType/>
-      </UserInfo>
-    </SharedWithUsers>
-  </documentManagement>
-</p:properties>
-</file>
-
-<file path=customXml/item7.xml><?xml version="1.0" encoding="utf-8"?>
-<?mso-contentType ?>
-<FormTemplates xmlns="http://schemas.microsoft.com/sharepoint/v3/contenttype/forms">
-  <Display>DocumentLibraryForm</Display>
-  <Edit>DocumentLibraryForm</Edit>
-  <New>DocumentLibraryForm</New>
-</FormTemplates>
-</file>
-
-<file path=customXml/item8.xml><?xml version="1.0" encoding="utf-8"?>
 <ct:contentTypeSchema xmlns:ct="http://schemas.microsoft.com/office/2006/metadata/contentType" xmlns:ma="http://schemas.microsoft.com/office/2006/metadata/properties/metaAttributes" ct:_="" ma:_="" ma:contentTypeName="Document" ma:contentTypeID="0x010100674EDBEC711BD14FBA6FF5C10FEFEAC7" ma:contentTypeVersion="2" ma:contentTypeDescription="Create a new document." ma:contentTypeScope="" ma:versionID="2439c5e21841780d4f192983b535a097">
   <xsd:schema xmlns:xsd="http://www.w3.org/2001/XMLSchema" xmlns:xs="http://www.w3.org/2001/XMLSchema" xmlns:p="http://schemas.microsoft.com/office/2006/metadata/properties" xmlns:ns2="83cd2334-221a-48c3-9034-bfd1542dfe28" targetNamespace="http://schemas.microsoft.com/office/2006/metadata/properties" ma:root="true" ma:fieldsID="2bca9163d8d0b233c3086236a9289b04" ns2:_="">
     <xsd:import namespace="83cd2334-221a-48c3-9034-bfd1542dfe28"/>
@@ -41218,29 +41090,203 @@
 </ct:contentTypeSchema>
 </file>
 
-<file path=customXml/item9.xml><?xml version="1.0" encoding="utf-8"?>
+<file path=customXml/item28.xml><?xml version="1.0" encoding="utf-8"?>
+<Control xmlns="http://schemas.microsoft.com/VisualStudio/2011/storyboarding/control">
+  <Id Name="369f9055-6b6c-48b9-9320-5df2d46c430a" Revision="1" Stencil="7276b9ef-3953-4dce-a89b-ed85f20b8b93" StencilVersion="1.0"/>
+</Control>
+</file>
+
+<file path=customXml/item29.xml><?xml version="1.0" encoding="utf-8"?>
+<Control xmlns="http://schemas.microsoft.com/VisualStudio/2011/storyboarding/control">
+  <Id Name="d69996e1-3d61-4686-9b63-f1b855c596ab" Revision="1" Stencil="7276b9ef-3953-4dce-a89b-ed85f20b8b93" StencilVersion="1.0"/>
+</Control>
+</file>
+
+<file path=customXml/item3.xml><?xml version="1.0" encoding="utf-8"?>
+<Control xmlns="http://schemas.microsoft.com/VisualStudio/2011/storyboarding/control">
+  <Id Name="a53d73d2-368b-429e-b817-1324eec1382c" Revision="1" Stencil="7276b9ef-3953-4dce-a89b-ed85f20b8b93" StencilVersion="1.0"/>
+</Control>
+</file>
+
+<file path=customXml/item30.xml><?xml version="1.0" encoding="utf-8"?>
+<Control xmlns="http://schemas.microsoft.com/VisualStudio/2011/storyboarding/control">
+  <Id Name="369f9055-6b6c-48b9-9320-5df2d46c430a" Revision="1" Stencil="7276b9ef-3953-4dce-a89b-ed85f20b8b93" StencilVersion="1.0"/>
+</Control>
+</file>
+
+<file path=customXml/item31.xml><?xml version="1.0" encoding="utf-8"?>
 <Control xmlns="http://schemas.microsoft.com/VisualStudio/2011/storyboarding/control">
   <Id Name="a2191c86-fc50-4add-948c-129f6b5a88d8" Revision="1" Stencil="7276b9ef-3953-4dce-a89b-ed85f20b8b93" StencilVersion="1.0"/>
 </Control>
 </file>
 
+<file path=customXml/item32.xml><?xml version="1.0" encoding="utf-8"?>
+<?mso-contentType ?>
+<FormTemplates xmlns="http://schemas.microsoft.com/sharepoint/v3/contenttype/forms">
+  <Display>DocumentLibraryForm</Display>
+  <Edit>DocumentLibraryForm</Edit>
+  <New>DocumentLibraryForm</New>
+</FormTemplates>
+</file>
+
+<file path=customXml/item33.xml><?xml version="1.0" encoding="utf-8"?>
+<Control xmlns="http://schemas.microsoft.com/VisualStudio/2011/storyboarding/control">
+  <Id Name="fb22c541-ded0-47fa-8877-83a4c2d16227" Revision="1" Stencil="7276b9ef-3953-4dce-a89b-ed85f20b8b93" StencilVersion="1.0"/>
+</Control>
+</file>
+
+<file path=customXml/item34.xml><?xml version="1.0" encoding="utf-8"?>
+<p:properties xmlns:p="http://schemas.microsoft.com/office/2006/metadata/properties" xmlns:xsi="http://www.w3.org/2001/XMLSchema-instance" xmlns:pc="http://schemas.microsoft.com/office/infopath/2007/PartnerControls">
+  <documentManagement>
+    <SharedWithUsers xmlns="83cd2334-221a-48c3-9034-bfd1542dfe28">
+      <UserInfo>
+        <DisplayName>Gilad Turbahn</DisplayName>
+        <AccountId>511</AccountId>
+        <AccountType/>
+      </UserInfo>
+      <UserInfo>
+        <DisplayName>Keith Boyd</DisplayName>
+        <AccountId>993</AccountId>
+        <AccountType/>
+      </UserInfo>
+      <UserInfo>
+        <DisplayName>Christopher Harrison</DisplayName>
+        <AccountId>1176</AccountId>
+        <AccountType/>
+      </UserInfo>
+    </SharedWithUsers>
+  </documentManagement>
+</p:properties>
+</file>
+
+<file path=customXml/item35.xml><?xml version="1.0" encoding="utf-8"?>
+<p:properties xmlns:p="http://schemas.microsoft.com/office/2006/metadata/properties" xmlns:xsi="http://www.w3.org/2001/XMLSchema-instance" xmlns:pc="http://schemas.microsoft.com/office/infopath/2007/PartnerControls">
+  <documentManagement>
+    <SharedWithUsers xmlns="83cd2334-221a-48c3-9034-bfd1542dfe28">
+      <UserInfo>
+        <DisplayName>Gilad Turbahn</DisplayName>
+        <AccountId>511</AccountId>
+        <AccountType/>
+      </UserInfo>
+      <UserInfo>
+        <DisplayName>Keith Boyd</DisplayName>
+        <AccountId>993</AccountId>
+        <AccountType/>
+      </UserInfo>
+      <UserInfo>
+        <DisplayName>Christopher Harrison</DisplayName>
+        <AccountId>1176</AccountId>
+        <AccountType/>
+      </UserInfo>
+    </SharedWithUsers>
+  </documentManagement>
+</p:properties>
+</file>
+
+<file path=customXml/item4.xml><?xml version="1.0" encoding="utf-8"?>
+<Control xmlns="http://schemas.microsoft.com/VisualStudio/2011/storyboarding/control">
+  <Id Name="d69996e1-3d61-4686-9b63-f1b855c596ab" Revision="1" Stencil="7276b9ef-3953-4dce-a89b-ed85f20b8b93" StencilVersion="1.0"/>
+</Control>
+</file>
+
+<file path=customXml/item5.xml><?xml version="1.0" encoding="utf-8"?>
+<Control xmlns="http://schemas.microsoft.com/VisualStudio/2011/storyboarding/control">
+  <Id Name="fb22c541-ded0-47fa-8877-83a4c2d16227" Revision="1" Stencil="7276b9ef-3953-4dce-a89b-ed85f20b8b93" StencilVersion="1.0"/>
+</Control>
+</file>
+
+<file path=customXml/item6.xml><?xml version="1.0" encoding="utf-8"?>
+<?mso-contentType ?>
+<FormTemplates xmlns="http://schemas.microsoft.com/sharepoint/v3/contenttype/forms">
+  <Display>DocumentLibraryForm</Display>
+  <Edit>DocumentLibraryForm</Edit>
+  <New>DocumentLibraryForm</New>
+</FormTemplates>
+</file>
+
+<file path=customXml/item7.xml><?xml version="1.0" encoding="utf-8"?>
+<Control xmlns="http://schemas.microsoft.com/VisualStudio/2011/storyboarding/control">
+  <Id Name="369f9055-6b6c-48b9-9320-5df2d46c430a" Revision="1" Stencil="7276b9ef-3953-4dce-a89b-ed85f20b8b93" StencilVersion="1.0"/>
+</Control>
+</file>
+
+<file path=customXml/item8.xml><?xml version="1.0" encoding="utf-8"?>
+<Control xmlns="http://schemas.microsoft.com/VisualStudio/2011/storyboarding/control">
+  <Id Name="a53d73d2-368b-429e-b817-1324eec1382c" Revision="1" Stencil="7276b9ef-3953-4dce-a89b-ed85f20b8b93" StencilVersion="1.0"/>
+</Control>
+</file>
+
+<file path=customXml/item9.xml><?xml version="1.0" encoding="utf-8"?>
+<Control xmlns="http://schemas.microsoft.com/VisualStudio/2011/storyboarding/control">
+  <Id Name="369f9055-6b6c-48b9-9320-5df2d46c430a" Revision="1" Stencil="7276b9ef-3953-4dce-a89b-ed85f20b8b93" StencilVersion="1.0"/>
+</Control>
+</file>
+
 <file path=customXml/itemProps1.xml><?xml version="1.0" encoding="utf-8"?>
-<ds:datastoreItem xmlns:ds="http://schemas.openxmlformats.org/officeDocument/2006/customXml" ds:itemID="{F990F116-B58F-4255-B05B-DA3808E0E5C6}">
+<ds:datastoreItem xmlns:ds="http://schemas.openxmlformats.org/officeDocument/2006/customXml" ds:itemID="{38217AA1-CC95-49A9-B284-2ED4D347D7CA}">
   <ds:schemaRefs>
-    <ds:schemaRef ds:uri="http://schemas.microsoft.com/office/2006/documentManagement/types"/>
-    <ds:schemaRef ds:uri="83cd2334-221a-48c3-9034-bfd1542dfe28"/>
-    <ds:schemaRef ds:uri="http://purl.org/dc/elements/1.1/"/>
-    <ds:schemaRef ds:uri="http://schemas.microsoft.com/office/2006/metadata/properties"/>
-    <ds:schemaRef ds:uri="http://purl.org/dc/terms/"/>
-    <ds:schemaRef ds:uri="http://schemas.microsoft.com/office/infopath/2007/PartnerControls"/>
-    <ds:schemaRef ds:uri="http://schemas.openxmlformats.org/package/2006/metadata/core-properties"/>
-    <ds:schemaRef ds:uri="http://www.w3.org/XML/1998/namespace"/>
-    <ds:schemaRef ds:uri="http://purl.org/dc/dcmitype/"/>
+    <ds:schemaRef ds:uri="http://schemas.microsoft.com/VisualStudio/2011/storyboarding/control"/>
   </ds:schemaRefs>
 </ds:datastoreItem>
 </file>
 
 <file path=customXml/itemProps10.xml><?xml version="1.0" encoding="utf-8"?>
+<ds:datastoreItem xmlns:ds="http://schemas.openxmlformats.org/officeDocument/2006/customXml" ds:itemID="{0B54C583-7BAB-4080-8093-C5F84F5A225A}">
+  <ds:schemaRefs>
+    <ds:schemaRef ds:uri="http://schemas.microsoft.com/VisualStudio/2011/storyboarding/control"/>
+  </ds:schemaRefs>
+</ds:datastoreItem>
+</file>
+
+<file path=customXml/itemProps11.xml><?xml version="1.0" encoding="utf-8"?>
+<ds:datastoreItem xmlns:ds="http://schemas.openxmlformats.org/officeDocument/2006/customXml" ds:itemID="{0282FB20-2D4C-459D-8468-77D1D3C6925D}">
+  <ds:schemaRefs>
+    <ds:schemaRef ds:uri="http://schemas.microsoft.com/VisualStudio/2011/storyboarding/control"/>
+  </ds:schemaRefs>
+</ds:datastoreItem>
+</file>
+
+<file path=customXml/itemProps12.xml><?xml version="1.0" encoding="utf-8"?>
+<ds:datastoreItem xmlns:ds="http://schemas.openxmlformats.org/officeDocument/2006/customXml" ds:itemID="{D6FEE829-2115-45B4-8110-670FD454542B}">
+  <ds:schemaRefs>
+    <ds:schemaRef ds:uri="http://schemas.microsoft.com/VisualStudio/2011/storyboarding/control"/>
+  </ds:schemaRefs>
+</ds:datastoreItem>
+</file>
+
+<file path=customXml/itemProps13.xml><?xml version="1.0" encoding="utf-8"?>
+<ds:datastoreItem xmlns:ds="http://schemas.openxmlformats.org/officeDocument/2006/customXml" ds:itemID="{3DC6CABD-46E1-4C27-A0B3-616DC56F8E5C}">
+  <ds:schemaRefs>
+    <ds:schemaRef ds:uri="http://schemas.microsoft.com/VisualStudio/2011/storyboarding/control"/>
+  </ds:schemaRefs>
+</ds:datastoreItem>
+</file>
+
+<file path=customXml/itemProps14.xml><?xml version="1.0" encoding="utf-8"?>
+<ds:datastoreItem xmlns:ds="http://schemas.openxmlformats.org/officeDocument/2006/customXml" ds:itemID="{67213E6F-7B96-4222-888B-63710B06D885}">
+  <ds:schemaRefs>
+    <ds:schemaRef ds:uri="http://schemas.microsoft.com/VisualStudio/2011/storyboarding/control"/>
+  </ds:schemaRefs>
+</ds:datastoreItem>
+</file>
+
+<file path=customXml/itemProps15.xml><?xml version="1.0" encoding="utf-8"?>
+<ds:datastoreItem xmlns:ds="http://schemas.openxmlformats.org/officeDocument/2006/customXml" ds:itemID="{B5105A87-47B6-44F6-97FD-4619C0556604}">
+  <ds:schemaRefs>
+    <ds:schemaRef ds:uri="http://schemas.microsoft.com/VisualStudio/2011/storyboarding/control"/>
+  </ds:schemaRefs>
+</ds:datastoreItem>
+</file>
+
+<file path=customXml/itemProps16.xml><?xml version="1.0" encoding="utf-8"?>
+<ds:datastoreItem xmlns:ds="http://schemas.openxmlformats.org/officeDocument/2006/customXml" ds:itemID="{4B16F4FE-7C26-4443-B426-81998D23ED87}">
+  <ds:schemaRefs>
+    <ds:schemaRef ds:uri="http://schemas.microsoft.com/VisualStudio/2011/storyboarding/control"/>
+  </ds:schemaRefs>
+</ds:datastoreItem>
+</file>
+
+<file path=customXml/itemProps17.xml><?xml version="1.0" encoding="utf-8"?>
 <ds:datastoreItem xmlns:ds="http://schemas.openxmlformats.org/officeDocument/2006/customXml" ds:itemID="{C0F92A87-A216-45A9-B9C0-0515663D35BF}">
   <ds:schemaRefs>
     <ds:schemaRef ds:uri="http://schemas.microsoft.com/VisualStudio/2011/storyboarding/control"/>
@@ -41248,31 +41294,47 @@
 </ds:datastoreItem>
 </file>
 
-<file path=customXml/itemProps11.xml><?xml version="1.0" encoding="utf-8"?>
-<ds:datastoreItem xmlns:ds="http://schemas.openxmlformats.org/officeDocument/2006/customXml" ds:itemID="{0B54C583-7BAB-4080-8093-C5F84F5A225A}">
+<file path=customXml/itemProps18.xml><?xml version="1.0" encoding="utf-8"?>
+<ds:datastoreItem xmlns:ds="http://schemas.openxmlformats.org/officeDocument/2006/customXml" ds:itemID="{432851C6-BC05-4673-B853-6D08AB80CDC4}">
   <ds:schemaRefs>
     <ds:schemaRef ds:uri="http://schemas.microsoft.com/VisualStudio/2011/storyboarding/control"/>
   </ds:schemaRefs>
 </ds:datastoreItem>
 </file>
 
-<file path=customXml/itemProps12.xml><?xml version="1.0" encoding="utf-8"?>
-<ds:datastoreItem xmlns:ds="http://schemas.openxmlformats.org/officeDocument/2006/customXml" ds:itemID="{C63AC2F0-1DEB-4E91-A88A-7A014A172F4F}">
+<file path=customXml/itemProps19.xml><?xml version="1.0" encoding="utf-8"?>
+<ds:datastoreItem xmlns:ds="http://schemas.openxmlformats.org/officeDocument/2006/customXml" ds:itemID="{ED350DFE-2319-4AB0-BC96-1D36D125365A}">
   <ds:schemaRefs>
     <ds:schemaRef ds:uri="http://schemas.microsoft.com/VisualStudio/2011/storyboarding/control"/>
   </ds:schemaRefs>
 </ds:datastoreItem>
 </file>
 
-<file path=customXml/itemProps13.xml><?xml version="1.0" encoding="utf-8"?>
-<ds:datastoreItem xmlns:ds="http://schemas.openxmlformats.org/officeDocument/2006/customXml" ds:itemID="{38217AA1-CC95-49A9-B284-2ED4D347D7CA}">
+<file path=customXml/itemProps2.xml><?xml version="1.0" encoding="utf-8"?>
+<ds:datastoreItem xmlns:ds="http://schemas.openxmlformats.org/officeDocument/2006/customXml" ds:itemID="{6FB9D450-4C47-4A44-8C0D-C78D8A54C46F}">
   <ds:schemaRefs>
     <ds:schemaRef ds:uri="http://schemas.microsoft.com/VisualStudio/2011/storyboarding/control"/>
   </ds:schemaRefs>
 </ds:datastoreItem>
 </file>
 
-<file path=customXml/itemProps14.xml><?xml version="1.0" encoding="utf-8"?>
+<file path=customXml/itemProps20.xml><?xml version="1.0" encoding="utf-8"?>
+<ds:datastoreItem xmlns:ds="http://schemas.openxmlformats.org/officeDocument/2006/customXml" ds:itemID="{08C4EE12-DF69-4FFC-9E40-C7991F3490A6}">
+  <ds:schemaRefs>
+    <ds:schemaRef ds:uri="http://schemas.microsoft.com/VisualStudio/2011/storyboarding/control"/>
+  </ds:schemaRefs>
+</ds:datastoreItem>
+</file>
+
+<file path=customXml/itemProps21.xml><?xml version="1.0" encoding="utf-8"?>
+<ds:datastoreItem xmlns:ds="http://schemas.openxmlformats.org/officeDocument/2006/customXml" ds:itemID="{8BD595CA-AC5E-43B9-B966-E468A16E8322}">
+  <ds:schemaRefs>
+    <ds:schemaRef ds:uri="http://schemas.microsoft.com/VisualStudio/2011/storyboarding/control"/>
+  </ds:schemaRefs>
+</ds:datastoreItem>
+</file>
+
+<file path=customXml/itemProps22.xml><?xml version="1.0" encoding="utf-8"?>
 <ds:datastoreItem xmlns:ds="http://schemas.openxmlformats.org/officeDocument/2006/customXml" ds:itemID="{3C954CC5-1CAC-4EC3-9791-8630483065B9}">
   <ds:schemaRefs>
     <ds:schemaRef ds:uri="http://schemas.microsoft.com/VisualStudio/2011/storyboarding/control"/>
@@ -41280,71 +41342,7 @@
 </ds:datastoreItem>
 </file>
 
-<file path=customXml/itemProps15.xml><?xml version="1.0" encoding="utf-8"?>
-<ds:datastoreItem xmlns:ds="http://schemas.openxmlformats.org/officeDocument/2006/customXml" ds:itemID="{67213E6F-7B96-4222-888B-63710B06D885}">
-  <ds:schemaRefs>
-    <ds:schemaRef ds:uri="http://schemas.microsoft.com/VisualStudio/2011/storyboarding/control"/>
-  </ds:schemaRefs>
-</ds:datastoreItem>
-</file>
-
-<file path=customXml/itemProps16.xml><?xml version="1.0" encoding="utf-8"?>
-<ds:datastoreItem xmlns:ds="http://schemas.openxmlformats.org/officeDocument/2006/customXml" ds:itemID="{4E805D65-1532-4BB0-8F41-8013167C0009}">
-  <ds:schemaRefs>
-    <ds:schemaRef ds:uri="http://schemas.microsoft.com/VisualStudio/2011/storyboarding/control"/>
-  </ds:schemaRefs>
-</ds:datastoreItem>
-</file>
-
-<file path=customXml/itemProps17.xml><?xml version="1.0" encoding="utf-8"?>
-<ds:datastoreItem xmlns:ds="http://schemas.openxmlformats.org/officeDocument/2006/customXml" ds:itemID="{7959CC6A-F423-4783-B968-3BCC86A7394E}">
-  <ds:schemaRefs>
-    <ds:schemaRef ds:uri="http://schemas.microsoft.com/VisualStudio/2011/storyboarding/control"/>
-  </ds:schemaRefs>
-</ds:datastoreItem>
-</file>
-
-<file path=customXml/itemProps18.xml><?xml version="1.0" encoding="utf-8"?>
-<ds:datastoreItem xmlns:ds="http://schemas.openxmlformats.org/officeDocument/2006/customXml" ds:itemID="{6FB9D450-4C47-4A44-8C0D-C78D8A54C46F}">
-  <ds:schemaRefs>
-    <ds:schemaRef ds:uri="http://schemas.microsoft.com/VisualStudio/2011/storyboarding/control"/>
-  </ds:schemaRefs>
-</ds:datastoreItem>
-</file>
-
-<file path=customXml/itemProps19.xml><?xml version="1.0" encoding="utf-8"?>
-<ds:datastoreItem xmlns:ds="http://schemas.openxmlformats.org/officeDocument/2006/customXml" ds:itemID="{432851C6-BC05-4673-B853-6D08AB80CDC4}">
-  <ds:schemaRefs>
-    <ds:schemaRef ds:uri="http://schemas.microsoft.com/VisualStudio/2011/storyboarding/control"/>
-  </ds:schemaRefs>
-</ds:datastoreItem>
-</file>
-
-<file path=customXml/itemProps2.xml><?xml version="1.0" encoding="utf-8"?>
-<ds:datastoreItem xmlns:ds="http://schemas.openxmlformats.org/officeDocument/2006/customXml" ds:itemID="{42D603BF-B513-4201-A599-21BA0F4FFC40}">
-  <ds:schemaRefs>
-    <ds:schemaRef ds:uri="http://schemas.microsoft.com/VisualStudio/2011/storyboarding/control"/>
-  </ds:schemaRefs>
-</ds:datastoreItem>
-</file>
-
-<file path=customXml/itemProps20.xml><?xml version="1.0" encoding="utf-8"?>
-<ds:datastoreItem xmlns:ds="http://schemas.openxmlformats.org/officeDocument/2006/customXml" ds:itemID="{376216F9-AF6B-4844-AE8C-B9F953F916AB}">
-  <ds:schemaRefs>
-    <ds:schemaRef ds:uri="http://schemas.microsoft.com/VisualStudio/2011/storyboarding/control"/>
-  </ds:schemaRefs>
-</ds:datastoreItem>
-</file>
-
-<file path=customXml/itemProps21.xml><?xml version="1.0" encoding="utf-8"?>
-<ds:datastoreItem xmlns:ds="http://schemas.openxmlformats.org/officeDocument/2006/customXml" ds:itemID="{366CA990-F93D-4100-9654-65D9E30F4E1C}">
-  <ds:schemaRefs>
-    <ds:schemaRef ds:uri="http://schemas.microsoft.com/VisualStudio/2011/storyboarding/control"/>
-  </ds:schemaRefs>
-</ds:datastoreItem>
-</file>
-
-<file path=customXml/itemProps22.xml><?xml version="1.0" encoding="utf-8"?>
+<file path=customXml/itemProps23.xml><?xml version="1.0" encoding="utf-8"?>
 <ds:datastoreItem xmlns:ds="http://schemas.openxmlformats.org/officeDocument/2006/customXml" ds:itemID="{F68D8396-E21C-4AFF-8FDD-70D00673D0EE}">
   <ds:schemaRefs>
     <ds:schemaRef ds:uri="http://schemas.microsoft.com/VisualStudio/2011/storyboarding/control"/>
@@ -41352,16 +41350,8 @@
 </ds:datastoreItem>
 </file>
 
-<file path=customXml/itemProps23.xml><?xml version="1.0" encoding="utf-8"?>
-<ds:datastoreItem xmlns:ds="http://schemas.openxmlformats.org/officeDocument/2006/customXml" ds:itemID="{B5105A87-47B6-44F6-97FD-4619C0556604}">
-  <ds:schemaRefs>
-    <ds:schemaRef ds:uri="http://schemas.microsoft.com/VisualStudio/2011/storyboarding/control"/>
-  </ds:schemaRefs>
-</ds:datastoreItem>
-</file>
-
 <file path=customXml/itemProps24.xml><?xml version="1.0" encoding="utf-8"?>
-<ds:datastoreItem xmlns:ds="http://schemas.openxmlformats.org/officeDocument/2006/customXml" ds:itemID="{0282FB20-2D4C-459D-8468-77D1D3C6925D}">
+<ds:datastoreItem xmlns:ds="http://schemas.openxmlformats.org/officeDocument/2006/customXml" ds:itemID="{8893E80D-6D0C-4E0F-AA22-E5615BB87E5B}">
   <ds:schemaRefs>
     <ds:schemaRef ds:uri="http://schemas.microsoft.com/VisualStudio/2011/storyboarding/control"/>
   </ds:schemaRefs>
@@ -41369,7 +41359,7 @@
 </file>
 
 <file path=customXml/itemProps25.xml><?xml version="1.0" encoding="utf-8"?>
-<ds:datastoreItem xmlns:ds="http://schemas.openxmlformats.org/officeDocument/2006/customXml" ds:itemID="{8257D6BC-B71E-4D95-81E4-A1D4A8174168}">
+<ds:datastoreItem xmlns:ds="http://schemas.openxmlformats.org/officeDocument/2006/customXml" ds:itemID="{D4B5F268-5930-44CD-BDF1-D0A04D4BBC1C}">
   <ds:schemaRefs>
     <ds:schemaRef ds:uri="http://schemas.microsoft.com/VisualStudio/2011/storyboarding/control"/>
   </ds:schemaRefs>
@@ -41377,7 +41367,7 @@
 </file>
 
 <file path=customXml/itemProps26.xml><?xml version="1.0" encoding="utf-8"?>
-<ds:datastoreItem xmlns:ds="http://schemas.openxmlformats.org/officeDocument/2006/customXml" ds:itemID="{21F6B647-976A-41D0-B760-9DF9DFC6AE3C}">
+<ds:datastoreItem xmlns:ds="http://schemas.openxmlformats.org/officeDocument/2006/customXml" ds:itemID="{4E8278DB-3CDD-48A7-992E-A7596AD335B9}">
   <ds:schemaRefs>
     <ds:schemaRef ds:uri="http://schemas.microsoft.com/VisualStudio/2011/storyboarding/control"/>
   </ds:schemaRefs>
@@ -41385,126 +41375,6 @@
 </file>
 
 <file path=customXml/itemProps27.xml><?xml version="1.0" encoding="utf-8"?>
-<ds:datastoreItem xmlns:ds="http://schemas.openxmlformats.org/officeDocument/2006/customXml" ds:itemID="{8893E80D-6D0C-4E0F-AA22-E5615BB87E5B}">
-  <ds:schemaRefs>
-    <ds:schemaRef ds:uri="http://schemas.microsoft.com/VisualStudio/2011/storyboarding/control"/>
-  </ds:schemaRefs>
-</ds:datastoreItem>
-</file>
-
-<file path=customXml/itemProps28.xml><?xml version="1.0" encoding="utf-8"?>
-<ds:datastoreItem xmlns:ds="http://schemas.openxmlformats.org/officeDocument/2006/customXml" ds:itemID="{4B16F4FE-7C26-4443-B426-81998D23ED87}">
-  <ds:schemaRefs>
-    <ds:schemaRef ds:uri="http://schemas.microsoft.com/VisualStudio/2011/storyboarding/control"/>
-  </ds:schemaRefs>
-</ds:datastoreItem>
-</file>
-
-<file path=customXml/itemProps29.xml><?xml version="1.0" encoding="utf-8"?>
-<ds:datastoreItem xmlns:ds="http://schemas.openxmlformats.org/officeDocument/2006/customXml" ds:itemID="{82DB428A-B8F8-483F-8276-095629A8ECDB}">
-  <ds:schemaRefs>
-    <ds:schemaRef ds:uri="http://schemas.microsoft.com/VisualStudio/2011/storyboarding/control"/>
-  </ds:schemaRefs>
-</ds:datastoreItem>
-</file>
-
-<file path=customXml/itemProps3.xml><?xml version="1.0" encoding="utf-8"?>
-<ds:datastoreItem xmlns:ds="http://schemas.openxmlformats.org/officeDocument/2006/customXml" ds:itemID="{FE651ABA-5DC1-4ABD-A06E-055AE54B337B}">
-  <ds:schemaRefs>
-    <ds:schemaRef ds:uri="http://schemas.microsoft.com/VisualStudio/2011/storyboarding/control"/>
-  </ds:schemaRefs>
-</ds:datastoreItem>
-</file>
-
-<file path=customXml/itemProps30.xml><?xml version="1.0" encoding="utf-8"?>
-<ds:datastoreItem xmlns:ds="http://schemas.openxmlformats.org/officeDocument/2006/customXml" ds:itemID="{D4B5F268-5930-44CD-BDF1-D0A04D4BBC1C}">
-  <ds:schemaRefs>
-    <ds:schemaRef ds:uri="http://schemas.microsoft.com/VisualStudio/2011/storyboarding/control"/>
-  </ds:schemaRefs>
-</ds:datastoreItem>
-</file>
-
-<file path=customXml/itemProps31.xml><?xml version="1.0" encoding="utf-8"?>
-<ds:datastoreItem xmlns:ds="http://schemas.openxmlformats.org/officeDocument/2006/customXml" ds:itemID="{ED350DFE-2319-4AB0-BC96-1D36D125365A}">
-  <ds:schemaRefs>
-    <ds:schemaRef ds:uri="http://schemas.microsoft.com/VisualStudio/2011/storyboarding/control"/>
-  </ds:schemaRefs>
-</ds:datastoreItem>
-</file>
-
-<file path=customXml/itemProps32.xml><?xml version="1.0" encoding="utf-8"?>
-<ds:datastoreItem xmlns:ds="http://schemas.openxmlformats.org/officeDocument/2006/customXml" ds:itemID="{D6FEE829-2115-45B4-8110-670FD454542B}">
-  <ds:schemaRefs>
-    <ds:schemaRef ds:uri="http://schemas.microsoft.com/VisualStudio/2011/storyboarding/control"/>
-  </ds:schemaRefs>
-</ds:datastoreItem>
-</file>
-
-<file path=customXml/itemProps33.xml><?xml version="1.0" encoding="utf-8"?>
-<ds:datastoreItem xmlns:ds="http://schemas.openxmlformats.org/officeDocument/2006/customXml" ds:itemID="{758FDAC0-319D-4A54-8D8E-1D42CB1F8004}">
-  <ds:schemaRefs>
-    <ds:schemaRef ds:uri="http://schemas.microsoft.com/sharepoint/v3/contenttype/forms"/>
-  </ds:schemaRefs>
-</ds:datastoreItem>
-</file>
-
-<file path=customXml/itemProps34.xml><?xml version="1.0" encoding="utf-8"?>
-<ds:datastoreItem xmlns:ds="http://schemas.openxmlformats.org/officeDocument/2006/customXml" ds:itemID="{4C1B3C27-4803-4D72-A3F8-6668A3F0A24B}">
-  <ds:schemaRefs>
-    <ds:schemaRef ds:uri="http://schemas.microsoft.com/VisualStudio/2011/storyboarding/control"/>
-  </ds:schemaRefs>
-</ds:datastoreItem>
-</file>
-
-<file path=customXml/itemProps35.xml><?xml version="1.0" encoding="utf-8"?>
-<ds:datastoreItem xmlns:ds="http://schemas.openxmlformats.org/officeDocument/2006/customXml" ds:itemID="{4E8278DB-3CDD-48A7-992E-A7596AD335B9}">
-  <ds:schemaRefs>
-    <ds:schemaRef ds:uri="http://schemas.microsoft.com/VisualStudio/2011/storyboarding/control"/>
-  </ds:schemaRefs>
-</ds:datastoreItem>
-</file>
-
-<file path=customXml/itemProps4.xml><?xml version="1.0" encoding="utf-8"?>
-<ds:datastoreItem xmlns:ds="http://schemas.openxmlformats.org/officeDocument/2006/customXml" ds:itemID="{08C4EE12-DF69-4FFC-9E40-C7991F3490A6}">
-  <ds:schemaRefs>
-    <ds:schemaRef ds:uri="http://schemas.microsoft.com/VisualStudio/2011/storyboarding/control"/>
-  </ds:schemaRefs>
-</ds:datastoreItem>
-</file>
-
-<file path=customXml/itemProps5.xml><?xml version="1.0" encoding="utf-8"?>
-<ds:datastoreItem xmlns:ds="http://schemas.openxmlformats.org/officeDocument/2006/customXml" ds:itemID="{3DC6CABD-46E1-4C27-A0B3-616DC56F8E5C}">
-  <ds:schemaRefs>
-    <ds:schemaRef ds:uri="http://schemas.microsoft.com/VisualStudio/2011/storyboarding/control"/>
-  </ds:schemaRefs>
-</ds:datastoreItem>
-</file>
-
-<file path=customXml/itemProps6.xml><?xml version="1.0" encoding="utf-8"?>
-<ds:datastoreItem xmlns:ds="http://schemas.openxmlformats.org/officeDocument/2006/customXml" ds:itemID="{29A419E7-5506-4231-819E-32B0D2087F4E}">
-  <ds:schemaRefs>
-    <ds:schemaRef ds:uri="http://schemas.microsoft.com/office/infopath/2007/PartnerControls"/>
-    <ds:schemaRef ds:uri="http://purl.org/dc/dcmitype/"/>
-    <ds:schemaRef ds:uri="http://schemas.microsoft.com/office/2006/metadata/properties"/>
-    <ds:schemaRef ds:uri="83cd2334-221a-48c3-9034-bfd1542dfe28"/>
-    <ds:schemaRef ds:uri="http://purl.org/dc/elements/1.1/"/>
-    <ds:schemaRef ds:uri="http://purl.org/dc/terms/"/>
-    <ds:schemaRef ds:uri="http://schemas.openxmlformats.org/package/2006/metadata/core-properties"/>
-    <ds:schemaRef ds:uri="http://schemas.microsoft.com/office/2006/documentManagement/types"/>
-    <ds:schemaRef ds:uri="http://www.w3.org/XML/1998/namespace"/>
-  </ds:schemaRefs>
-</ds:datastoreItem>
-</file>
-
-<file path=customXml/itemProps7.xml><?xml version="1.0" encoding="utf-8"?>
-<ds:datastoreItem xmlns:ds="http://schemas.openxmlformats.org/officeDocument/2006/customXml" ds:itemID="{50326EE5-754B-4E02-99C4-DDA8AB4ABBEE}">
-  <ds:schemaRefs>
-    <ds:schemaRef ds:uri="http://schemas.microsoft.com/sharepoint/v3/contenttype/forms"/>
-  </ds:schemaRefs>
-</ds:datastoreItem>
-</file>
-
-<file path=customXml/itemProps8.xml><?xml version="1.0" encoding="utf-8"?>
 <ds:datastoreItem xmlns:ds="http://schemas.openxmlformats.org/officeDocument/2006/customXml" ds:itemID="{11F98F69-7518-4AE2-AE7B-E037DC9DDC97}">
   <ds:schemaRefs>
     <ds:schemaRef ds:uri="http://schemas.microsoft.com/office/2006/metadata/contentType"/>
@@ -41522,8 +41392,136 @@
 </ds:datastoreItem>
 </file>
 
+<file path=customXml/itemProps28.xml><?xml version="1.0" encoding="utf-8"?>
+<ds:datastoreItem xmlns:ds="http://schemas.openxmlformats.org/officeDocument/2006/customXml" ds:itemID="{FE651ABA-5DC1-4ABD-A06E-055AE54B337B}">
+  <ds:schemaRefs>
+    <ds:schemaRef ds:uri="http://schemas.microsoft.com/VisualStudio/2011/storyboarding/control"/>
+  </ds:schemaRefs>
+</ds:datastoreItem>
+</file>
+
+<file path=customXml/itemProps29.xml><?xml version="1.0" encoding="utf-8"?>
+<ds:datastoreItem xmlns:ds="http://schemas.openxmlformats.org/officeDocument/2006/customXml" ds:itemID="{C63AC2F0-1DEB-4E91-A88A-7A014A172F4F}">
+  <ds:schemaRefs>
+    <ds:schemaRef ds:uri="http://schemas.microsoft.com/VisualStudio/2011/storyboarding/control"/>
+  </ds:schemaRefs>
+</ds:datastoreItem>
+</file>
+
+<file path=customXml/itemProps3.xml><?xml version="1.0" encoding="utf-8"?>
+<ds:datastoreItem xmlns:ds="http://schemas.openxmlformats.org/officeDocument/2006/customXml" ds:itemID="{21F6B647-976A-41D0-B760-9DF9DFC6AE3C}">
+  <ds:schemaRefs>
+    <ds:schemaRef ds:uri="http://schemas.microsoft.com/VisualStudio/2011/storyboarding/control"/>
+  </ds:schemaRefs>
+</ds:datastoreItem>
+</file>
+
+<file path=customXml/itemProps30.xml><?xml version="1.0" encoding="utf-8"?>
+<ds:datastoreItem xmlns:ds="http://schemas.openxmlformats.org/officeDocument/2006/customXml" ds:itemID="{7959CC6A-F423-4783-B968-3BCC86A7394E}">
+  <ds:schemaRefs>
+    <ds:schemaRef ds:uri="http://schemas.microsoft.com/VisualStudio/2011/storyboarding/control"/>
+  </ds:schemaRefs>
+</ds:datastoreItem>
+</file>
+
+<file path=customXml/itemProps31.xml><?xml version="1.0" encoding="utf-8"?>
+<ds:datastoreItem xmlns:ds="http://schemas.openxmlformats.org/officeDocument/2006/customXml" ds:itemID="{8257D6BC-B71E-4D95-81E4-A1D4A8174168}">
+  <ds:schemaRefs>
+    <ds:schemaRef ds:uri="http://schemas.microsoft.com/VisualStudio/2011/storyboarding/control"/>
+  </ds:schemaRefs>
+</ds:datastoreItem>
+</file>
+
+<file path=customXml/itemProps32.xml><?xml version="1.0" encoding="utf-8"?>
+<ds:datastoreItem xmlns:ds="http://schemas.openxmlformats.org/officeDocument/2006/customXml" ds:itemID="{758FDAC0-319D-4A54-8D8E-1D42CB1F8004}">
+  <ds:schemaRefs>
+    <ds:schemaRef ds:uri="http://schemas.microsoft.com/sharepoint/v3/contenttype/forms"/>
+  </ds:schemaRefs>
+</ds:datastoreItem>
+</file>
+
+<file path=customXml/itemProps33.xml><?xml version="1.0" encoding="utf-8"?>
+<ds:datastoreItem xmlns:ds="http://schemas.openxmlformats.org/officeDocument/2006/customXml" ds:itemID="{376216F9-AF6B-4844-AE8C-B9F953F916AB}">
+  <ds:schemaRefs>
+    <ds:schemaRef ds:uri="http://schemas.microsoft.com/VisualStudio/2011/storyboarding/control"/>
+  </ds:schemaRefs>
+</ds:datastoreItem>
+</file>
+
+<file path=customXml/itemProps34.xml><?xml version="1.0" encoding="utf-8"?>
+<ds:datastoreItem xmlns:ds="http://schemas.openxmlformats.org/officeDocument/2006/customXml" ds:itemID="{F990F116-B58F-4255-B05B-DA3808E0E5C6}">
+  <ds:schemaRefs>
+    <ds:schemaRef ds:uri="http://schemas.microsoft.com/office/2006/documentManagement/types"/>
+    <ds:schemaRef ds:uri="83cd2334-221a-48c3-9034-bfd1542dfe28"/>
+    <ds:schemaRef ds:uri="http://purl.org/dc/elements/1.1/"/>
+    <ds:schemaRef ds:uri="http://schemas.microsoft.com/office/2006/metadata/properties"/>
+    <ds:schemaRef ds:uri="http://purl.org/dc/terms/"/>
+    <ds:schemaRef ds:uri="http://schemas.microsoft.com/office/infopath/2007/PartnerControls"/>
+    <ds:schemaRef ds:uri="http://schemas.openxmlformats.org/package/2006/metadata/core-properties"/>
+    <ds:schemaRef ds:uri="http://www.w3.org/XML/1998/namespace"/>
+    <ds:schemaRef ds:uri="http://purl.org/dc/dcmitype/"/>
+  </ds:schemaRefs>
+</ds:datastoreItem>
+</file>
+
+<file path=customXml/itemProps35.xml><?xml version="1.0" encoding="utf-8"?>
+<ds:datastoreItem xmlns:ds="http://schemas.openxmlformats.org/officeDocument/2006/customXml" ds:itemID="{29A419E7-5506-4231-819E-32B0D2087F4E}">
+  <ds:schemaRefs>
+    <ds:schemaRef ds:uri="http://schemas.microsoft.com/office/infopath/2007/PartnerControls"/>
+    <ds:schemaRef ds:uri="http://purl.org/dc/dcmitype/"/>
+    <ds:schemaRef ds:uri="http://schemas.microsoft.com/office/2006/metadata/properties"/>
+    <ds:schemaRef ds:uri="83cd2334-221a-48c3-9034-bfd1542dfe28"/>
+    <ds:schemaRef ds:uri="http://purl.org/dc/elements/1.1/"/>
+    <ds:schemaRef ds:uri="http://purl.org/dc/terms/"/>
+    <ds:schemaRef ds:uri="http://schemas.openxmlformats.org/package/2006/metadata/core-properties"/>
+    <ds:schemaRef ds:uri="http://schemas.microsoft.com/office/2006/documentManagement/types"/>
+    <ds:schemaRef ds:uri="http://www.w3.org/XML/1998/namespace"/>
+  </ds:schemaRefs>
+</ds:datastoreItem>
+</file>
+
+<file path=customXml/itemProps4.xml><?xml version="1.0" encoding="utf-8"?>
+<ds:datastoreItem xmlns:ds="http://schemas.openxmlformats.org/officeDocument/2006/customXml" ds:itemID="{366CA990-F93D-4100-9654-65D9E30F4E1C}">
+  <ds:schemaRefs>
+    <ds:schemaRef ds:uri="http://schemas.microsoft.com/VisualStudio/2011/storyboarding/control"/>
+  </ds:schemaRefs>
+</ds:datastoreItem>
+</file>
+
+<file path=customXml/itemProps5.xml><?xml version="1.0" encoding="utf-8"?>
+<ds:datastoreItem xmlns:ds="http://schemas.openxmlformats.org/officeDocument/2006/customXml" ds:itemID="{4C1B3C27-4803-4D72-A3F8-6668A3F0A24B}">
+  <ds:schemaRefs>
+    <ds:schemaRef ds:uri="http://schemas.microsoft.com/VisualStudio/2011/storyboarding/control"/>
+  </ds:schemaRefs>
+</ds:datastoreItem>
+</file>
+
+<file path=customXml/itemProps6.xml><?xml version="1.0" encoding="utf-8"?>
+<ds:datastoreItem xmlns:ds="http://schemas.openxmlformats.org/officeDocument/2006/customXml" ds:itemID="{50326EE5-754B-4E02-99C4-DDA8AB4ABBEE}">
+  <ds:schemaRefs>
+    <ds:schemaRef ds:uri="http://schemas.microsoft.com/sharepoint/v3/contenttype/forms"/>
+  </ds:schemaRefs>
+</ds:datastoreItem>
+</file>
+
+<file path=customXml/itemProps7.xml><?xml version="1.0" encoding="utf-8"?>
+<ds:datastoreItem xmlns:ds="http://schemas.openxmlformats.org/officeDocument/2006/customXml" ds:itemID="{42D603BF-B513-4201-A599-21BA0F4FFC40}">
+  <ds:schemaRefs>
+    <ds:schemaRef ds:uri="http://schemas.microsoft.com/VisualStudio/2011/storyboarding/control"/>
+  </ds:schemaRefs>
+</ds:datastoreItem>
+</file>
+
+<file path=customXml/itemProps8.xml><?xml version="1.0" encoding="utf-8"?>
+<ds:datastoreItem xmlns:ds="http://schemas.openxmlformats.org/officeDocument/2006/customXml" ds:itemID="{4E805D65-1532-4BB0-8F41-8013167C0009}">
+  <ds:schemaRefs>
+    <ds:schemaRef ds:uri="http://schemas.microsoft.com/VisualStudio/2011/storyboarding/control"/>
+  </ds:schemaRefs>
+</ds:datastoreItem>
+</file>
+
 <file path=customXml/itemProps9.xml><?xml version="1.0" encoding="utf-8"?>
-<ds:datastoreItem xmlns:ds="http://schemas.openxmlformats.org/officeDocument/2006/customXml" ds:itemID="{8BD595CA-AC5E-43B9-B966-E468A16E8322}">
+<ds:datastoreItem xmlns:ds="http://schemas.openxmlformats.org/officeDocument/2006/customXml" ds:itemID="{82DB428A-B8F8-483F-8276-095629A8ECDB}">
   <ds:schemaRefs>
     <ds:schemaRef ds:uri="http://schemas.microsoft.com/VisualStudio/2011/storyboarding/control"/>
   </ds:schemaRefs>

</xml_diff>